<commit_message>
complete 3 basic RPCs for NodeJS solution
</commit_message>
<xml_diff>
--- a/EaterySystemSlides.pptx
+++ b/EaterySystemSlides.pptx
@@ -6111,7 +6111,7 @@
         <p:spPr>
           <a:xfrm>
             <a:off x="755373" y="895349"/>
-            <a:ext cx="11383618" cy="4401205"/>
+            <a:ext cx="11383618" cy="4708981"/>
           </a:xfrm>
           <a:prstGeom prst="rect">
             <a:avLst/>
@@ -6149,6 +6149,37 @@
               <a:rPr lang="en-US" sz="2000" dirty="0"/>
               <a:t>3) Place and confirm order (POST …/order/new)</a:t>
             </a:r>
+          </a:p>
+          <a:p>
+            <a:r>
+              <a:rPr lang="en-US" sz="2000" dirty="0"/>
+              <a:t>	req body contains </a:t>
+            </a:r>
+            <a:r>
+              <a:rPr lang="en-US" sz="2000" dirty="0" err="1"/>
+              <a:t>restaurantId</a:t>
+            </a:r>
+            <a:r>
+              <a:rPr lang="en-US" sz="2000" dirty="0"/>
+              <a:t>, </a:t>
+            </a:r>
+            <a:r>
+              <a:rPr lang="en-US" sz="2000" dirty="0" err="1"/>
+              <a:t>tableNumber</a:t>
+            </a:r>
+            <a:r>
+              <a:rPr lang="en-US" sz="2000" dirty="0"/>
+              <a:t>, foods [{</a:t>
+            </a:r>
+            <a:r>
+              <a:rPr lang="en-US" sz="2000" dirty="0" err="1"/>
+              <a:t>foodId</a:t>
+            </a:r>
+            <a:r>
+              <a:rPr lang="en-US" sz="2000"/>
+              <a:t>, quantity}]</a:t>
+            </a:r>
+            <a:endParaRPr lang="en-US" sz="2000" dirty="0"/>
           </a:p>
           <a:p>
             <a:endParaRPr lang="en-US" sz="2000" dirty="0"/>
@@ -9018,7 +9049,7 @@
               <a:rPr lang="en-US" sz="2400" dirty="0">
                 <a:cs typeface="Arial" panose="020B0604020202020204" pitchFamily="34" charset="0"/>
               </a:rPr>
-              <a:t>Client 2</a:t>
+              <a:t>Client 3</a:t>
             </a:r>
           </a:p>
         </p:txBody>

</xml_diff>